<commit_message>
Updates to drawing #15
</commit_message>
<xml_diff>
--- a/High School/Modern Electricity and Electronics/Unit 6 - TinkerCAD Circuits/Section 2 - TinkerCAD Breadboards/Assets/U6S2 - TinkerCAD Breadboards.pptx
+++ b/High School/Modern Electricity and Electronics/Unit 6 - TinkerCAD Circuits/Section 2 - TinkerCAD Breadboards/Assets/U6S2 - TinkerCAD Breadboards.pptx
@@ -5,10 +5,10 @@
     <p:sldMasterId id="2147483705" r:id="rId1"/>
   </p:sldMasterIdLst>
   <p:notesMasterIdLst>
-    <p:notesMasterId r:id="rId15"/>
+    <p:notesMasterId r:id="rId16"/>
   </p:notesMasterIdLst>
   <p:handoutMasterIdLst>
-    <p:handoutMasterId r:id="rId16"/>
+    <p:handoutMasterId r:id="rId17"/>
   </p:handoutMasterIdLst>
   <p:sldIdLst>
     <p:sldId id="268" r:id="rId2"/>
@@ -24,6 +24,7 @@
     <p:sldId id="286" r:id="rId12"/>
     <p:sldId id="287" r:id="rId13"/>
     <p:sldId id="288" r:id="rId14"/>
+    <p:sldId id="289" r:id="rId15"/>
   </p:sldIdLst>
   <p:sldSz cx="12192000" cy="6858000"/>
   <p:notesSz cx="6858000" cy="9144000"/>
@@ -226,7 +227,7 @@
           <a:p>
             <a:fld id="{6AC4FB8F-ED15-48AB-97BD-17129D4E699D}" type="datetimeFigureOut">
               <a:rPr lang="en-US" smtClean="0"/>
-              <a:t>12/4/18</a:t>
+              <a:t>12/5/18</a:t>
             </a:fld>
             <a:endParaRPr lang="en-US" dirty="0"/>
           </a:p>
@@ -391,7 +392,7 @@
           <a:p>
             <a:fld id="{BBC9D437-CD83-4825-AD0D-5E7B341BC79B}" type="datetimeFigureOut">
               <a:rPr lang="en-US" smtClean="0"/>
-              <a:t>12/4/18</a:t>
+              <a:t>12/5/18</a:t>
             </a:fld>
             <a:endParaRPr lang="en-US" dirty="0"/>
           </a:p>
@@ -884,7 +885,7 @@
           <a:p>
             <a:fld id="{85AB7CBB-843F-464A-A764-71D6ADC27CFA}" type="datetime1">
               <a:rPr lang="en-US" smtClean="0"/>
-              <a:t>12/4/18</a:t>
+              <a:t>12/5/18</a:t>
             </a:fld>
             <a:endParaRPr lang="en-US" dirty="0"/>
           </a:p>
@@ -1109,7 +1110,7 @@
           <a:p>
             <a:fld id="{CBEFC03D-3A1F-4813-9337-02411FCC3A9A}" type="datetime1">
               <a:rPr lang="en-US" smtClean="0"/>
-              <a:t>12/4/18</a:t>
+              <a:t>12/5/18</a:t>
             </a:fld>
             <a:endParaRPr lang="en-US" dirty="0"/>
           </a:p>
@@ -1381,7 +1382,7 @@
           <a:p>
             <a:fld id="{3D638F79-DFA0-4C26-9553-23A017B69AB6}" type="datetime1">
               <a:rPr lang="en-US" smtClean="0"/>
-              <a:t>12/4/18</a:t>
+              <a:t>12/5/18</a:t>
             </a:fld>
             <a:endParaRPr lang="en-US" dirty="0"/>
           </a:p>
@@ -1492,7 +1493,7 @@
           <a:p>
             <a:fld id="{AA615CA6-EC4D-4728-8AA6-534BE7E9B67C}" type="datetime1">
               <a:rPr lang="en-US" smtClean="0"/>
-              <a:t>12/4/18</a:t>
+              <a:t>12/5/18</a:t>
             </a:fld>
             <a:endParaRPr lang="en-US" dirty="0"/>
           </a:p>
@@ -1677,7 +1678,7 @@
           <a:p>
             <a:fld id="{A70B34E7-E1D9-4FBF-A1A0-4009669A00BF}" type="datetime1">
               <a:rPr lang="en-US" smtClean="0"/>
-              <a:t>12/4/18</a:t>
+              <a:t>12/5/18</a:t>
             </a:fld>
             <a:endParaRPr lang="en-US" dirty="0"/>
           </a:p>
@@ -2037,7 +2038,7 @@
           <a:p>
             <a:fld id="{20EBB0C4-6273-4C6E-B9BD-2EDC30F1CD52}" type="datetimeFigureOut">
               <a:rPr lang="en-US" smtClean="0"/>
-              <a:t>12/4/18</a:t>
+              <a:t>12/5/18</a:t>
             </a:fld>
             <a:endParaRPr lang="en-US" dirty="0"/>
           </a:p>
@@ -2324,7 +2325,7 @@
           <a:p>
             <a:fld id="{7579E8B6-2F47-420B-83EA-EB2285D13EC9}" type="datetime1">
               <a:rPr lang="en-US" smtClean="0"/>
-              <a:t>12/4/18</a:t>
+              <a:t>12/5/18</a:t>
             </a:fld>
             <a:endParaRPr lang="en-US" dirty="0"/>
           </a:p>
@@ -2719,7 +2720,7 @@
           <a:p>
             <a:fld id="{2304803D-B10E-4B90-8456-A0E05393E233}" type="datetime1">
               <a:rPr lang="en-US" smtClean="0"/>
-              <a:t>12/4/18</a:t>
+              <a:t>12/5/18</a:t>
             </a:fld>
             <a:endParaRPr lang="en-US" dirty="0"/>
           </a:p>
@@ -2853,7 +2854,7 @@
           <a:p>
             <a:fld id="{CCE1E62F-6CCE-4064-96C2-2084AF883904}" type="datetime1">
               <a:rPr lang="en-US" smtClean="0"/>
-              <a:t>12/4/18</a:t>
+              <a:t>12/5/18</a:t>
             </a:fld>
             <a:endParaRPr lang="en-US" dirty="0"/>
           </a:p>
@@ -3040,7 +3041,7 @@
           <a:p>
             <a:fld id="{AA615CA6-EC4D-4728-8AA6-534BE7E9B67C}" type="datetime1">
               <a:rPr lang="en-US" smtClean="0"/>
-              <a:t>12/4/18</a:t>
+              <a:t>12/5/18</a:t>
             </a:fld>
             <a:endParaRPr lang="en-US" dirty="0"/>
           </a:p>
@@ -3410,7 +3411,7 @@
           <a:p>
             <a:fld id="{A6139942-0A2E-443A-842F-D6DE74360370}" type="datetime1">
               <a:rPr lang="en-US" smtClean="0"/>
-              <a:t>12/4/18</a:t>
+              <a:t>12/5/18</a:t>
             </a:fld>
             <a:endParaRPr lang="en-US" dirty="0"/>
           </a:p>
@@ -3803,7 +3804,7 @@
           <a:p>
             <a:fld id="{C9CAD897-D46E-4AD2-BD9B-49DD3E640873}" type="datetimeFigureOut">
               <a:rPr lang="en-US" smtClean="0"/>
-              <a:t>12/4/18</a:t>
+              <a:t>12/5/18</a:t>
             </a:fld>
             <a:endParaRPr lang="en-US" dirty="0"/>
           </a:p>
@@ -4154,7 +4155,7 @@
           <a:p>
             <a:fld id="{3F138946-C5C1-4A11-BA69-F12F43F8A94B}" type="datetime1">
               <a:rPr lang="en-US" smtClean="0"/>
-              <a:t>12/4/18</a:t>
+              <a:t>12/5/18</a:t>
             </a:fld>
             <a:endParaRPr lang="en-US" dirty="0"/>
           </a:p>
@@ -5302,6 +5303,179 @@
     <p:extLst>
       <p:ext uri="{BB962C8B-B14F-4D97-AF65-F5344CB8AC3E}">
         <p14:creationId xmlns:p14="http://schemas.microsoft.com/office/powerpoint/2010/main" val="380702714"/>
+      </p:ext>
+    </p:extLst>
+  </p:cSld>
+  <p:clrMapOvr>
+    <a:masterClrMapping/>
+  </p:clrMapOvr>
+  <mc:AlternateContent xmlns:mc="http://schemas.openxmlformats.org/markup-compatibility/2006" xmlns:p14="http://schemas.microsoft.com/office/powerpoint/2010/main">
+    <mc:Choice Requires="p14">
+      <p:transition spd="med" p14:dur="700">
+        <p:fade/>
+      </p:transition>
+    </mc:Choice>
+    <mc:Fallback xmlns="">
+      <p:transition spd="med">
+        <p:fade/>
+      </p:transition>
+    </mc:Fallback>
+  </mc:AlternateContent>
+</p:sld>
+</file>
+
+<file path=ppt/slides/slide14.xml><?xml version="1.0" encoding="utf-8"?>
+<p:sld xmlns:a="http://schemas.openxmlformats.org/drawingml/2006/main" xmlns:r="http://schemas.openxmlformats.org/officeDocument/2006/relationships" xmlns:p="http://schemas.openxmlformats.org/presentationml/2006/main">
+  <p:cSld>
+    <p:spTree>
+      <p:nvGrpSpPr>
+        <p:cNvPr id="1" name=""/>
+        <p:cNvGrpSpPr/>
+        <p:nvPr/>
+      </p:nvGrpSpPr>
+      <p:grpSpPr>
+        <a:xfrm>
+          <a:off x="0" y="0"/>
+          <a:ext cx="0" cy="0"/>
+          <a:chOff x="0" y="0"/>
+          <a:chExt cx="0" cy="0"/>
+        </a:xfrm>
+      </p:grpSpPr>
+      <p:sp>
+        <p:nvSpPr>
+          <p:cNvPr id="3" name="Title 2">
+            <a:extLst>
+              <a:ext uri="{FF2B5EF4-FFF2-40B4-BE49-F238E27FC236}">
+                <a16:creationId xmlns:a16="http://schemas.microsoft.com/office/drawing/2014/main" id="{2C3C342C-2DC7-0045-A9C5-BA30AD922C1E}"/>
+              </a:ext>
+            </a:extLst>
+          </p:cNvPr>
+          <p:cNvSpPr>
+            <a:spLocks noGrp="1"/>
+          </p:cNvSpPr>
+          <p:nvPr>
+            <p:ph type="title"/>
+          </p:nvPr>
+        </p:nvSpPr>
+        <p:spPr/>
+        <p:txBody>
+          <a:bodyPr/>
+          <a:lstStyle/>
+          <a:p>
+            <a:r>
+              <a:rPr lang="en-US" dirty="0"/>
+              <a:t>Workday Wednesday</a:t>
+            </a:r>
+          </a:p>
+        </p:txBody>
+      </p:sp>
+      <p:sp>
+        <p:nvSpPr>
+          <p:cNvPr id="4" name="Content Placeholder 3">
+            <a:extLst>
+              <a:ext uri="{FF2B5EF4-FFF2-40B4-BE49-F238E27FC236}">
+                <a16:creationId xmlns:a16="http://schemas.microsoft.com/office/drawing/2014/main" id="{D44FB4EA-3802-154A-99C5-22DEB0D33311}"/>
+              </a:ext>
+            </a:extLst>
+          </p:cNvPr>
+          <p:cNvSpPr>
+            <a:spLocks noGrp="1"/>
+          </p:cNvSpPr>
+          <p:nvPr>
+            <p:ph idx="1"/>
+          </p:nvPr>
+        </p:nvSpPr>
+        <p:spPr/>
+        <p:txBody>
+          <a:bodyPr/>
+          <a:lstStyle/>
+          <a:p>
+            <a:pPr>
+              <a:buFont typeface="Wingdings" pitchFamily="2" charset="2"/>
+              <a:buChar char="q"/>
+            </a:pPr>
+            <a:r>
+              <a:rPr lang="en-US" dirty="0"/>
+              <a:t> Complete Electricity &amp; Electronics #1 via </a:t>
+            </a:r>
+            <a:r>
+              <a:rPr lang="en-US" dirty="0" err="1"/>
+              <a:t>TinkerCAD</a:t>
+            </a:r>
+            <a:endParaRPr lang="en-US" dirty="0"/>
+          </a:p>
+          <a:p>
+            <a:pPr>
+              <a:buFont typeface="Wingdings" pitchFamily="2" charset="2"/>
+              <a:buChar char="q"/>
+            </a:pPr>
+            <a:r>
+              <a:rPr lang="en-US" dirty="0"/>
+              <a:t> Be sure to share the </a:t>
+            </a:r>
+            <a:r>
+              <a:rPr lang="en-US" b="1" u="sng" dirty="0"/>
+              <a:t>LINK </a:t>
+            </a:r>
+            <a:r>
+              <a:rPr lang="en-US" dirty="0"/>
+              <a:t> when completing the Classroom assignment in the comments</a:t>
+            </a:r>
+          </a:p>
+          <a:p>
+            <a:pPr>
+              <a:buFont typeface="Wingdings" pitchFamily="2" charset="2"/>
+              <a:buChar char="q"/>
+            </a:pPr>
+            <a:r>
+              <a:rPr lang="en-US" b="1" dirty="0"/>
+              <a:t> </a:t>
+            </a:r>
+            <a:r>
+              <a:rPr lang="en-US" b="1" u="sng" dirty="0"/>
+              <a:t>BOTH group members must complete the assignment </a:t>
+            </a:r>
+            <a:r>
+              <a:rPr lang="en-US" b="1" u="sng"/>
+              <a:t>in Classroom</a:t>
+            </a:r>
+            <a:endParaRPr lang="en-US" b="1" u="sng" dirty="0"/>
+          </a:p>
+        </p:txBody>
+      </p:sp>
+      <p:sp>
+        <p:nvSpPr>
+          <p:cNvPr id="2" name="Footer Placeholder 1">
+            <a:extLst>
+              <a:ext uri="{FF2B5EF4-FFF2-40B4-BE49-F238E27FC236}">
+                <a16:creationId xmlns:a16="http://schemas.microsoft.com/office/drawing/2014/main" id="{0A114A67-8B14-E04C-B6FE-533881D8BD48}"/>
+              </a:ext>
+            </a:extLst>
+          </p:cNvPr>
+          <p:cNvSpPr>
+            <a:spLocks noGrp="1"/>
+          </p:cNvSpPr>
+          <p:nvPr>
+            <p:ph type="ftr" sz="quarter" idx="11"/>
+          </p:nvPr>
+        </p:nvSpPr>
+        <p:spPr/>
+        <p:txBody>
+          <a:bodyPr/>
+          <a:lstStyle/>
+          <a:p>
+            <a:r>
+              <a:rPr lang="en-US"/>
+              <a:t>Add a footer</a:t>
+            </a:r>
+            <a:endParaRPr lang="en-US" dirty="0"/>
+          </a:p>
+        </p:txBody>
+      </p:sp>
+    </p:spTree>
+    <p:extLst>
+      <p:ext uri="{BB962C8B-B14F-4D97-AF65-F5344CB8AC3E}">
+        <p14:creationId xmlns:p14="http://schemas.microsoft.com/office/powerpoint/2010/main" val="3117225878"/>
       </p:ext>
     </p:extLst>
   </p:cSld>

</xml_diff>